<commit_message>
Updated Stock Concepts slides
</commit_message>
<xml_diff>
--- a/modules/ClassIntro/PPT_Stock.pptx
+++ b/modules/ClassIntro/PPT_Stock.pptx
@@ -8,12 +8,12 @@
     <p:notesMasterId r:id="rId8"/>
   </p:notesMasterIdLst>
   <p:sldIdLst>
-    <p:sldId id="257" r:id="rId2"/>
-    <p:sldId id="280" r:id="rId3"/>
-    <p:sldId id="281" r:id="rId4"/>
-    <p:sldId id="259" r:id="rId5"/>
-    <p:sldId id="262" r:id="rId6"/>
-    <p:sldId id="261" r:id="rId7"/>
+    <p:sldId id="282" r:id="rId2"/>
+    <p:sldId id="262" r:id="rId3"/>
+    <p:sldId id="261" r:id="rId4"/>
+    <p:sldId id="284" r:id="rId5"/>
+    <p:sldId id="285" r:id="rId6"/>
+    <p:sldId id="283" r:id="rId7"/>
   </p:sldIdLst>
   <p:sldSz cx="9144000" cy="6858000" type="screen4x3"/>
   <p:notesSz cx="6858000" cy="9144000"/>
@@ -663,7 +663,26 @@
           <a:bodyPr/>
           <a:lstStyle/>
           <a:p>
-            <a:endParaRPr lang="en-US"/>
+            <a:pPr eaLnBrk="1" hangingPunct="1"/>
+            <a:r>
+              <a:rPr lang="en-US" dirty="0" smtClean="0"/>
+              <a:t>Key concepts …</a:t>
+            </a:r>
+            <a:r>
+              <a:rPr lang="en-US" baseline="0" dirty="0" smtClean="0"/>
+              <a:t> (1) </a:t>
+            </a:r>
+            <a:r>
+              <a:rPr lang="en-US" dirty="0" smtClean="0"/>
+              <a:t>Closed (simplifies) and (2) Identifies unit for management and analysis (i.e., statistical population).</a:t>
+            </a:r>
+          </a:p>
+          <a:p>
+            <a:pPr eaLnBrk="1" hangingPunct="1"/>
+            <a:endParaRPr lang="en-US" dirty="0" smtClean="0"/>
+          </a:p>
+          <a:p>
+            <a:endParaRPr lang="en-US" dirty="0"/>
           </a:p>
         </p:txBody>
       </p:sp>
@@ -699,7 +718,7 @@
     </p:spTree>
     <p:extLst>
       <p:ext uri="{BB962C8B-B14F-4D97-AF65-F5344CB8AC3E}">
-        <p14:creationId xmlns:p14="http://schemas.microsoft.com/office/powerpoint/2010/main" val="818388141"/>
+        <p14:creationId xmlns:p14="http://schemas.microsoft.com/office/powerpoint/2010/main" val="3793606867"/>
       </p:ext>
     </p:extLst>
   </p:cSld>
@@ -811,7 +830,7 @@
               <a:pPr>
                 <a:defRPr/>
               </a:pPr>
-              <a:t>5</a:t>
+              <a:t>2</a:t>
             </a:fld>
             <a:endParaRPr lang="en-US"/>
           </a:p>
@@ -901,7 +920,7 @@
               <a:pPr>
                 <a:defRPr/>
               </a:pPr>
-              <a:t>6</a:t>
+              <a:t>3</a:t>
             </a:fld>
             <a:endParaRPr lang="en-US"/>
           </a:p>
@@ -4169,7 +4188,6 @@
               <a:rPr lang="en-US" smtClean="0"/>
               <a:t>Stock Concept</a:t>
             </a:r>
-            <a:endParaRPr lang="en-US" smtClean="0"/>
           </a:p>
         </p:txBody>
       </p:sp>
@@ -4334,9 +4352,10 @@
           <a:p>
             <a:pPr eaLnBrk="1" hangingPunct="1"/>
             <a:r>
-              <a:rPr lang="en-US" smtClean="0"/>
-              <a:t>Unit Stock</a:t>
-            </a:r>
+              <a:rPr lang="en-US" dirty="0" smtClean="0"/>
+              <a:t>Stock</a:t>
+            </a:r>
+            <a:endParaRPr lang="en-US" dirty="0" smtClean="0"/>
           </a:p>
         </p:txBody>
       </p:sp>
@@ -4350,1245 +4369,191 @@
             <p:ph type="body" idx="1"/>
           </p:nvPr>
         </p:nvSpPr>
-        <p:spPr/>
+        <p:spPr>
+          <a:xfrm>
+            <a:off x="0" y="914400"/>
+            <a:ext cx="9144000" cy="5562600"/>
+          </a:xfrm>
+        </p:spPr>
         <p:txBody>
           <a:bodyPr/>
           <a:lstStyle/>
           <a:p>
-            <a:pPr eaLnBrk="1" hangingPunct="1">
-              <a:buFontTx/>
-              <a:buNone/>
-            </a:pPr>
-            <a:r>
-              <a:rPr lang="en-US" dirty="0" smtClean="0"/>
-              <a:t>	“A unit stock can be theoretically described as a group of individuals of the same species whose gains by immigration and whose losses by emigration, if any, are negligible in relation to the rates of growth and mortality.</a:t>
-            </a:r>
-            <a:endParaRPr lang="en-US" sz="2400" i="1" dirty="0" smtClean="0">
-              <a:solidFill>
-                <a:schemeClr val="accent2"/>
-              </a:solidFill>
-            </a:endParaRPr>
+            <a:pPr eaLnBrk="1" hangingPunct="1"/>
+            <a:r>
+              <a:rPr lang="en-US" sz="3000" dirty="0" smtClean="0"/>
+              <a:t>A </a:t>
+            </a:r>
+            <a:r>
+              <a:rPr lang="en-US" sz="3000" dirty="0" smtClean="0"/>
+              <a:t>group of individuals of the same </a:t>
+            </a:r>
+            <a:r>
+              <a:rPr lang="en-US" sz="3000" dirty="0" smtClean="0"/>
+              <a:t>species where </a:t>
+            </a:r>
+            <a:r>
+              <a:rPr lang="en-US" sz="3000" dirty="0" smtClean="0"/>
+              <a:t>immigration and </a:t>
+            </a:r>
+            <a:r>
+              <a:rPr lang="en-US" sz="3000" dirty="0" smtClean="0"/>
+              <a:t>emigration are </a:t>
+            </a:r>
+            <a:r>
+              <a:rPr lang="en-US" sz="3000" dirty="0" smtClean="0"/>
+              <a:t>negligible in relation to </a:t>
+            </a:r>
+            <a:r>
+              <a:rPr lang="en-US" sz="3000" dirty="0" smtClean="0"/>
+              <a:t>growth </a:t>
+            </a:r>
+            <a:r>
+              <a:rPr lang="en-US" sz="3000" dirty="0" smtClean="0"/>
+              <a:t>and mortality. A </a:t>
+            </a:r>
+            <a:r>
+              <a:rPr lang="en-US" sz="3000" dirty="0" smtClean="0"/>
+              <a:t>stock </a:t>
+            </a:r>
+            <a:r>
+              <a:rPr lang="en-US" sz="3000" dirty="0" smtClean="0"/>
+              <a:t>is </a:t>
+            </a:r>
+            <a:r>
+              <a:rPr lang="en-US" sz="3000" dirty="0" smtClean="0"/>
+              <a:t>a </a:t>
+            </a:r>
+            <a:r>
+              <a:rPr lang="en-US" sz="3000" dirty="0" smtClean="0"/>
+              <a:t>self-contained population with its own spawning area. </a:t>
+            </a:r>
+            <a:r>
+              <a:rPr lang="en-US" sz="3000" dirty="0" smtClean="0"/>
+              <a:t>Fishing </a:t>
+            </a:r>
+            <a:r>
+              <a:rPr lang="en-US" sz="3000" dirty="0" smtClean="0"/>
+              <a:t>upon one </a:t>
+            </a:r>
+            <a:r>
+              <a:rPr lang="en-US" sz="3000" dirty="0" smtClean="0"/>
+              <a:t>stock </a:t>
+            </a:r>
+            <a:r>
+              <a:rPr lang="en-US" sz="3000" dirty="0" smtClean="0"/>
+              <a:t>has no effect upon </a:t>
+            </a:r>
+            <a:r>
+              <a:rPr lang="en-US" sz="3000" dirty="0" smtClean="0"/>
+              <a:t>other </a:t>
+            </a:r>
+            <a:r>
+              <a:rPr lang="en-US" sz="3000" dirty="0" smtClean="0"/>
+              <a:t>stocks.” </a:t>
+            </a:r>
+            <a:r>
+              <a:rPr lang="en-US" sz="3000" i="1" dirty="0" smtClean="0"/>
+              <a:t>–</a:t>
+            </a:r>
+            <a:r>
+              <a:rPr lang="en-US" sz="3000" dirty="0" smtClean="0"/>
+              <a:t> </a:t>
+            </a:r>
+            <a:r>
+              <a:rPr lang="en-US" sz="2000" dirty="0" smtClean="0"/>
+              <a:t>paraphrased from</a:t>
+            </a:r>
+            <a:r>
+              <a:rPr lang="en-US" sz="2000" i="1" dirty="0" smtClean="0"/>
+              <a:t> </a:t>
+            </a:r>
+            <a:r>
+              <a:rPr lang="en-US" sz="2000" i="1" dirty="0" smtClean="0">
+                <a:hlinkClick r:id="rId3"/>
+              </a:rPr>
+              <a:t>Holden and </a:t>
+            </a:r>
+            <a:r>
+              <a:rPr lang="en-US" sz="2000" i="1" dirty="0" err="1" smtClean="0">
+                <a:hlinkClick r:id="rId3"/>
+              </a:rPr>
+              <a:t>Raitt</a:t>
+            </a:r>
+            <a:r>
+              <a:rPr lang="en-US" sz="2000" i="1" dirty="0" smtClean="0">
+                <a:hlinkClick r:id="rId3"/>
+              </a:rPr>
+              <a:t>, </a:t>
+            </a:r>
+            <a:r>
+              <a:rPr lang="en-US" sz="2000" i="1" dirty="0" smtClean="0">
+                <a:hlinkClick r:id="rId3"/>
+              </a:rPr>
+              <a:t>1974</a:t>
+            </a:r>
+            <a:endParaRPr lang="en-US" sz="2000" i="1" dirty="0" smtClean="0"/>
+          </a:p>
+          <a:p>
+            <a:pPr eaLnBrk="1" hangingPunct="1"/>
+            <a:endParaRPr lang="en-US" sz="1800" i="1" dirty="0" smtClean="0"/>
+          </a:p>
+          <a:p>
+            <a:pPr eaLnBrk="1" hangingPunct="1"/>
+            <a:r>
+              <a:rPr lang="en-US" sz="3000" dirty="0" smtClean="0"/>
+              <a:t>Subpopulations </a:t>
+            </a:r>
+            <a:r>
+              <a:rPr lang="en-US" sz="3000" dirty="0"/>
+              <a:t>of a species for which intrinsic factors (growth, recruitment, mortality) are </a:t>
+            </a:r>
+            <a:r>
+              <a:rPr lang="en-US" sz="3000" dirty="0" smtClean="0"/>
+              <a:t>significant </a:t>
+            </a:r>
+            <a:r>
+              <a:rPr lang="en-US" sz="3000" dirty="0"/>
+              <a:t>factors determining the stock's </a:t>
+            </a:r>
+            <a:r>
+              <a:rPr lang="en-US" sz="3000" dirty="0" smtClean="0"/>
+              <a:t>dynamics</a:t>
+            </a:r>
+            <a:r>
+              <a:rPr lang="en-US" sz="3000" dirty="0"/>
+              <a:t>, while extrinsic factors (immigration and emigration) are traditionally ignored.” </a:t>
+            </a:r>
+            <a:r>
+              <a:rPr lang="en-US" sz="3000" i="1" dirty="0"/>
+              <a:t>– </a:t>
+            </a:r>
+            <a:r>
+              <a:rPr lang="en-US" sz="2000" dirty="0"/>
+              <a:t>paraphrased from</a:t>
+            </a:r>
+            <a:r>
+              <a:rPr lang="en-US" sz="2000" i="1" dirty="0"/>
+              <a:t> </a:t>
+            </a:r>
+            <a:r>
+              <a:rPr lang="en-US" sz="2000" i="1" dirty="0">
+                <a:hlinkClick r:id="rId4"/>
+              </a:rPr>
+              <a:t>Wikipedia</a:t>
+            </a:r>
+            <a:endParaRPr lang="en-US" sz="2000" i="1" dirty="0"/>
+          </a:p>
+          <a:p>
+            <a:pPr eaLnBrk="1" hangingPunct="1"/>
+            <a:endParaRPr lang="en-US" sz="2800" i="1" dirty="0" smtClean="0"/>
           </a:p>
         </p:txBody>
       </p:sp>
     </p:spTree>
     <p:extLst>
       <p:ext uri="{BB962C8B-B14F-4D97-AF65-F5344CB8AC3E}">
-        <p14:creationId xmlns:p14="http://schemas.microsoft.com/office/powerpoint/2010/main" val="2657060683"/>
-      </p:ext>
-    </p:extLst>
-  </p:cSld>
-  <p:clrMapOvr>
-    <a:masterClrMapping/>
-  </p:clrMapOvr>
-  <p:transition/>
-  <p:timing>
-    <p:tnLst>
-      <p:par>
-        <p:cTn id="1" dur="indefinite" restart="never" nodeType="tmRoot"/>
-      </p:par>
-    </p:tnLst>
-  </p:timing>
-</p:sld>
-</file>
-
-<file path=ppt/slides/slide2.xml><?xml version="1.0" encoding="utf-8"?>
-<p:sld xmlns:a="http://schemas.openxmlformats.org/drawingml/2006/main" xmlns:r="http://schemas.openxmlformats.org/officeDocument/2006/relationships" xmlns:p="http://schemas.openxmlformats.org/presentationml/2006/main">
-  <p:cSld>
-    <p:spTree>
-      <p:nvGrpSpPr>
-        <p:cNvPr id="1" name=""/>
-        <p:cNvGrpSpPr/>
-        <p:nvPr/>
-      </p:nvGrpSpPr>
-      <p:grpSpPr>
-        <a:xfrm>
-          <a:off x="0" y="0"/>
-          <a:ext cx="0" cy="0"/>
-          <a:chOff x="0" y="0"/>
-          <a:chExt cx="0" cy="0"/>
-        </a:xfrm>
-      </p:grpSpPr>
-      <p:sp>
-        <p:nvSpPr>
-          <p:cNvPr id="12290" name="Footer Placeholder 3"/>
-          <p:cNvSpPr>
-            <a:spLocks noGrp="1"/>
-          </p:cNvSpPr>
-          <p:nvPr>
-            <p:ph type="ftr" sz="quarter" idx="10"/>
-          </p:nvPr>
-        </p:nvSpPr>
-        <p:spPr>
-          <a:noFill/>
-          <a:ln/>
-          <a:extLst>
-            <a:ext uri="{909E8E84-426E-40DD-AFC4-6F175D3DCCD1}">
-              <a14:hiddenFill xmlns:a14="http://schemas.microsoft.com/office/drawing/2010/main">
-                <a:solidFill>
-                  <a:srgbClr val="FFFFFF"/>
-                </a:solidFill>
-              </a14:hiddenFill>
-            </a:ext>
-            <a:ext uri="{91240B29-F687-4F45-9708-019B960494DF}">
-              <a14:hiddenLine xmlns:a14="http://schemas.microsoft.com/office/drawing/2010/main" w="9525">
-                <a:solidFill>
-                  <a:srgbClr val="000000"/>
-                </a:solidFill>
-                <a:miter lim="800000"/>
-                <a:headEnd/>
-                <a:tailEnd/>
-              </a14:hiddenLine>
-            </a:ext>
-          </a:extLst>
-        </p:spPr>
-        <p:txBody>
-          <a:bodyPr/>
-          <a:lstStyle>
-            <a:lvl1pPr eaLnBrk="0" hangingPunct="0">
-              <a:defRPr>
-                <a:solidFill>
-                  <a:schemeClr val="tx1"/>
-                </a:solidFill>
-                <a:latin typeface="Arial" charset="0"/>
-              </a:defRPr>
-            </a:lvl1pPr>
-            <a:lvl2pPr marL="742950" indent="-285750" eaLnBrk="0" hangingPunct="0">
-              <a:defRPr>
-                <a:solidFill>
-                  <a:schemeClr val="tx1"/>
-                </a:solidFill>
-                <a:latin typeface="Arial" charset="0"/>
-              </a:defRPr>
-            </a:lvl2pPr>
-            <a:lvl3pPr marL="1143000" indent="-228600" eaLnBrk="0" hangingPunct="0">
-              <a:defRPr>
-                <a:solidFill>
-                  <a:schemeClr val="tx1"/>
-                </a:solidFill>
-                <a:latin typeface="Arial" charset="0"/>
-              </a:defRPr>
-            </a:lvl3pPr>
-            <a:lvl4pPr marL="1600200" indent="-228600" eaLnBrk="0" hangingPunct="0">
-              <a:defRPr>
-                <a:solidFill>
-                  <a:schemeClr val="tx1"/>
-                </a:solidFill>
-                <a:latin typeface="Arial" charset="0"/>
-              </a:defRPr>
-            </a:lvl4pPr>
-            <a:lvl5pPr marL="2057400" indent="-228600" eaLnBrk="0" hangingPunct="0">
-              <a:defRPr>
-                <a:solidFill>
-                  <a:schemeClr val="tx1"/>
-                </a:solidFill>
-                <a:latin typeface="Arial" charset="0"/>
-              </a:defRPr>
-            </a:lvl5pPr>
-            <a:lvl6pPr marL="2514600" indent="-228600" eaLnBrk="0" fontAlgn="base" hangingPunct="0">
-              <a:spcBef>
-                <a:spcPct val="0"/>
-              </a:spcBef>
-              <a:spcAft>
-                <a:spcPct val="0"/>
-              </a:spcAft>
-              <a:defRPr>
-                <a:solidFill>
-                  <a:schemeClr val="tx1"/>
-                </a:solidFill>
-                <a:latin typeface="Arial" charset="0"/>
-              </a:defRPr>
-            </a:lvl6pPr>
-            <a:lvl7pPr marL="2971800" indent="-228600" eaLnBrk="0" fontAlgn="base" hangingPunct="0">
-              <a:spcBef>
-                <a:spcPct val="0"/>
-              </a:spcBef>
-              <a:spcAft>
-                <a:spcPct val="0"/>
-              </a:spcAft>
-              <a:defRPr>
-                <a:solidFill>
-                  <a:schemeClr val="tx1"/>
-                </a:solidFill>
-                <a:latin typeface="Arial" charset="0"/>
-              </a:defRPr>
-            </a:lvl7pPr>
-            <a:lvl8pPr marL="3429000" indent="-228600" eaLnBrk="0" fontAlgn="base" hangingPunct="0">
-              <a:spcBef>
-                <a:spcPct val="0"/>
-              </a:spcBef>
-              <a:spcAft>
-                <a:spcPct val="0"/>
-              </a:spcAft>
-              <a:defRPr>
-                <a:solidFill>
-                  <a:schemeClr val="tx1"/>
-                </a:solidFill>
-                <a:latin typeface="Arial" charset="0"/>
-              </a:defRPr>
-            </a:lvl8pPr>
-            <a:lvl9pPr marL="3886200" indent="-228600" eaLnBrk="0" fontAlgn="base" hangingPunct="0">
-              <a:spcBef>
-                <a:spcPct val="0"/>
-              </a:spcBef>
-              <a:spcAft>
-                <a:spcPct val="0"/>
-              </a:spcAft>
-              <a:defRPr>
-                <a:solidFill>
-                  <a:schemeClr val="tx1"/>
-                </a:solidFill>
-                <a:latin typeface="Arial" charset="0"/>
-              </a:defRPr>
-            </a:lvl9pPr>
-          </a:lstStyle>
-          <a:p>
-            <a:pPr eaLnBrk="1" hangingPunct="1"/>
-            <a:r>
-              <a:rPr lang="en-US" smtClean="0"/>
-              <a:t>Stock Concept</a:t>
-            </a:r>
-            <a:endParaRPr lang="en-US" smtClean="0"/>
-          </a:p>
-        </p:txBody>
-      </p:sp>
-      <p:sp>
-        <p:nvSpPr>
-          <p:cNvPr id="12291" name="Slide Number Placeholder 4"/>
-          <p:cNvSpPr>
-            <a:spLocks noGrp="1"/>
-          </p:cNvSpPr>
-          <p:nvPr>
-            <p:ph type="sldNum" sz="quarter" idx="11"/>
-          </p:nvPr>
-        </p:nvSpPr>
-        <p:spPr>
-          <a:noFill/>
-          <a:ln/>
-          <a:extLst>
-            <a:ext uri="{909E8E84-426E-40DD-AFC4-6F175D3DCCD1}">
-              <a14:hiddenFill xmlns:a14="http://schemas.microsoft.com/office/drawing/2010/main">
-                <a:solidFill>
-                  <a:srgbClr val="FFFFFF"/>
-                </a:solidFill>
-              </a14:hiddenFill>
-            </a:ext>
-            <a:ext uri="{91240B29-F687-4F45-9708-019B960494DF}">
-              <a14:hiddenLine xmlns:a14="http://schemas.microsoft.com/office/drawing/2010/main" w="9525">
-                <a:solidFill>
-                  <a:srgbClr val="000000"/>
-                </a:solidFill>
-                <a:miter lim="800000"/>
-                <a:headEnd/>
-                <a:tailEnd/>
-              </a14:hiddenLine>
-            </a:ext>
-          </a:extLst>
-        </p:spPr>
-        <p:txBody>
-          <a:bodyPr/>
-          <a:lstStyle>
-            <a:lvl1pPr eaLnBrk="0" hangingPunct="0">
-              <a:defRPr>
-                <a:solidFill>
-                  <a:schemeClr val="tx1"/>
-                </a:solidFill>
-                <a:latin typeface="Arial" charset="0"/>
-              </a:defRPr>
-            </a:lvl1pPr>
-            <a:lvl2pPr marL="742950" indent="-285750" eaLnBrk="0" hangingPunct="0">
-              <a:defRPr>
-                <a:solidFill>
-                  <a:schemeClr val="tx1"/>
-                </a:solidFill>
-                <a:latin typeface="Arial" charset="0"/>
-              </a:defRPr>
-            </a:lvl2pPr>
-            <a:lvl3pPr marL="1143000" indent="-228600" eaLnBrk="0" hangingPunct="0">
-              <a:defRPr>
-                <a:solidFill>
-                  <a:schemeClr val="tx1"/>
-                </a:solidFill>
-                <a:latin typeface="Arial" charset="0"/>
-              </a:defRPr>
-            </a:lvl3pPr>
-            <a:lvl4pPr marL="1600200" indent="-228600" eaLnBrk="0" hangingPunct="0">
-              <a:defRPr>
-                <a:solidFill>
-                  <a:schemeClr val="tx1"/>
-                </a:solidFill>
-                <a:latin typeface="Arial" charset="0"/>
-              </a:defRPr>
-            </a:lvl4pPr>
-            <a:lvl5pPr marL="2057400" indent="-228600" eaLnBrk="0" hangingPunct="0">
-              <a:defRPr>
-                <a:solidFill>
-                  <a:schemeClr val="tx1"/>
-                </a:solidFill>
-                <a:latin typeface="Arial" charset="0"/>
-              </a:defRPr>
-            </a:lvl5pPr>
-            <a:lvl6pPr marL="2514600" indent="-228600" eaLnBrk="0" fontAlgn="base" hangingPunct="0">
-              <a:spcBef>
-                <a:spcPct val="0"/>
-              </a:spcBef>
-              <a:spcAft>
-                <a:spcPct val="0"/>
-              </a:spcAft>
-              <a:defRPr>
-                <a:solidFill>
-                  <a:schemeClr val="tx1"/>
-                </a:solidFill>
-                <a:latin typeface="Arial" charset="0"/>
-              </a:defRPr>
-            </a:lvl6pPr>
-            <a:lvl7pPr marL="2971800" indent="-228600" eaLnBrk="0" fontAlgn="base" hangingPunct="0">
-              <a:spcBef>
-                <a:spcPct val="0"/>
-              </a:spcBef>
-              <a:spcAft>
-                <a:spcPct val="0"/>
-              </a:spcAft>
-              <a:defRPr>
-                <a:solidFill>
-                  <a:schemeClr val="tx1"/>
-                </a:solidFill>
-                <a:latin typeface="Arial" charset="0"/>
-              </a:defRPr>
-            </a:lvl7pPr>
-            <a:lvl8pPr marL="3429000" indent="-228600" eaLnBrk="0" fontAlgn="base" hangingPunct="0">
-              <a:spcBef>
-                <a:spcPct val="0"/>
-              </a:spcBef>
-              <a:spcAft>
-                <a:spcPct val="0"/>
-              </a:spcAft>
-              <a:defRPr>
-                <a:solidFill>
-                  <a:schemeClr val="tx1"/>
-                </a:solidFill>
-                <a:latin typeface="Arial" charset="0"/>
-              </a:defRPr>
-            </a:lvl8pPr>
-            <a:lvl9pPr marL="3886200" indent="-228600" eaLnBrk="0" fontAlgn="base" hangingPunct="0">
-              <a:spcBef>
-                <a:spcPct val="0"/>
-              </a:spcBef>
-              <a:spcAft>
-                <a:spcPct val="0"/>
-              </a:spcAft>
-              <a:defRPr>
-                <a:solidFill>
-                  <a:schemeClr val="tx1"/>
-                </a:solidFill>
-                <a:latin typeface="Arial" charset="0"/>
-              </a:defRPr>
-            </a:lvl9pPr>
-          </a:lstStyle>
-          <a:p>
-            <a:pPr eaLnBrk="1" hangingPunct="1"/>
-            <a:fld id="{49AE2D1C-40B6-42A8-AAE0-913D246340EF}" type="slidenum">
-              <a:rPr lang="en-US" smtClean="0"/>
-              <a:pPr eaLnBrk="1" hangingPunct="1"/>
-              <a:t>2</a:t>
-            </a:fld>
-            <a:endParaRPr lang="en-US" smtClean="0"/>
-          </a:p>
-        </p:txBody>
-      </p:sp>
-      <p:sp>
-        <p:nvSpPr>
-          <p:cNvPr id="12292" name="Rectangle 2"/>
-          <p:cNvSpPr>
-            <a:spLocks noGrp="1" noChangeArrowheads="1"/>
-          </p:cNvSpPr>
-          <p:nvPr>
-            <p:ph type="title"/>
-          </p:nvPr>
-        </p:nvSpPr>
-        <p:spPr/>
-        <p:txBody>
-          <a:bodyPr/>
-          <a:lstStyle/>
-          <a:p>
-            <a:pPr eaLnBrk="1" hangingPunct="1"/>
-            <a:r>
-              <a:rPr lang="en-US" smtClean="0"/>
-              <a:t>Unit Stock</a:t>
-            </a:r>
-          </a:p>
-        </p:txBody>
-      </p:sp>
-      <p:sp>
-        <p:nvSpPr>
-          <p:cNvPr id="12293" name="Rectangle 3"/>
-          <p:cNvSpPr>
-            <a:spLocks noGrp="1" noChangeArrowheads="1"/>
-          </p:cNvSpPr>
-          <p:nvPr>
-            <p:ph type="body" idx="1"/>
-          </p:nvPr>
-        </p:nvSpPr>
-        <p:spPr/>
-        <p:txBody>
-          <a:bodyPr/>
-          <a:lstStyle/>
-          <a:p>
-            <a:pPr eaLnBrk="1" hangingPunct="1">
-              <a:buFontTx/>
-              <a:buNone/>
-            </a:pPr>
-            <a:r>
-              <a:rPr lang="en-US" dirty="0" smtClean="0"/>
-              <a:t>	“</a:t>
-            </a:r>
-            <a:r>
-              <a:rPr lang="en-US" dirty="0" smtClean="0">
-                <a:solidFill>
-                  <a:schemeClr val="bg1">
-                    <a:lumMod val="50000"/>
-                  </a:schemeClr>
-                </a:solidFill>
-              </a:rPr>
-              <a:t>A unit stock can be theoretically described as a group of individuals of the same species whose gains by immigration and whose losses by emigration, if any, are negligible in relation to the rates of growth and mortality. </a:t>
-            </a:r>
-            <a:r>
-              <a:rPr lang="en-US" dirty="0" smtClean="0"/>
-              <a:t>A unit stock is essentially a self-contained population with its own spawning area.</a:t>
-            </a:r>
-            <a:endParaRPr lang="en-US" sz="2400" i="1" dirty="0" smtClean="0">
-              <a:solidFill>
-                <a:schemeClr val="accent2"/>
-              </a:solidFill>
-            </a:endParaRPr>
-          </a:p>
-        </p:txBody>
-      </p:sp>
-    </p:spTree>
-    <p:extLst>
-      <p:ext uri="{BB962C8B-B14F-4D97-AF65-F5344CB8AC3E}">
-        <p14:creationId xmlns:p14="http://schemas.microsoft.com/office/powerpoint/2010/main" val="3131204191"/>
-      </p:ext>
-    </p:extLst>
-  </p:cSld>
-  <p:clrMapOvr>
-    <a:masterClrMapping/>
-  </p:clrMapOvr>
-  <p:transition/>
-  <p:timing>
-    <p:tnLst>
-      <p:par>
-        <p:cTn id="1" dur="indefinite" restart="never" nodeType="tmRoot"/>
-      </p:par>
-    </p:tnLst>
-  </p:timing>
-</p:sld>
-</file>
-
-<file path=ppt/slides/slide3.xml><?xml version="1.0" encoding="utf-8"?>
-<p:sld xmlns:a="http://schemas.openxmlformats.org/drawingml/2006/main" xmlns:r="http://schemas.openxmlformats.org/officeDocument/2006/relationships" xmlns:p="http://schemas.openxmlformats.org/presentationml/2006/main">
-  <p:cSld>
-    <p:spTree>
-      <p:nvGrpSpPr>
-        <p:cNvPr id="1" name=""/>
-        <p:cNvGrpSpPr/>
-        <p:nvPr/>
-      </p:nvGrpSpPr>
-      <p:grpSpPr>
-        <a:xfrm>
-          <a:off x="0" y="0"/>
-          <a:ext cx="0" cy="0"/>
-          <a:chOff x="0" y="0"/>
-          <a:chExt cx="0" cy="0"/>
-        </a:xfrm>
-      </p:grpSpPr>
-      <p:sp>
-        <p:nvSpPr>
-          <p:cNvPr id="12290" name="Footer Placeholder 3"/>
-          <p:cNvSpPr>
-            <a:spLocks noGrp="1"/>
-          </p:cNvSpPr>
-          <p:nvPr>
-            <p:ph type="ftr" sz="quarter" idx="10"/>
-          </p:nvPr>
-        </p:nvSpPr>
-        <p:spPr>
-          <a:noFill/>
-          <a:ln/>
-          <a:extLst>
-            <a:ext uri="{909E8E84-426E-40DD-AFC4-6F175D3DCCD1}">
-              <a14:hiddenFill xmlns:a14="http://schemas.microsoft.com/office/drawing/2010/main">
-                <a:solidFill>
-                  <a:srgbClr val="FFFFFF"/>
-                </a:solidFill>
-              </a14:hiddenFill>
-            </a:ext>
-            <a:ext uri="{91240B29-F687-4F45-9708-019B960494DF}">
-              <a14:hiddenLine xmlns:a14="http://schemas.microsoft.com/office/drawing/2010/main" w="9525">
-                <a:solidFill>
-                  <a:srgbClr val="000000"/>
-                </a:solidFill>
-                <a:miter lim="800000"/>
-                <a:headEnd/>
-                <a:tailEnd/>
-              </a14:hiddenLine>
-            </a:ext>
-          </a:extLst>
-        </p:spPr>
-        <p:txBody>
-          <a:bodyPr/>
-          <a:lstStyle>
-            <a:lvl1pPr eaLnBrk="0" hangingPunct="0">
-              <a:defRPr>
-                <a:solidFill>
-                  <a:schemeClr val="tx1"/>
-                </a:solidFill>
-                <a:latin typeface="Arial" charset="0"/>
-              </a:defRPr>
-            </a:lvl1pPr>
-            <a:lvl2pPr marL="742950" indent="-285750" eaLnBrk="0" hangingPunct="0">
-              <a:defRPr>
-                <a:solidFill>
-                  <a:schemeClr val="tx1"/>
-                </a:solidFill>
-                <a:latin typeface="Arial" charset="0"/>
-              </a:defRPr>
-            </a:lvl2pPr>
-            <a:lvl3pPr marL="1143000" indent="-228600" eaLnBrk="0" hangingPunct="0">
-              <a:defRPr>
-                <a:solidFill>
-                  <a:schemeClr val="tx1"/>
-                </a:solidFill>
-                <a:latin typeface="Arial" charset="0"/>
-              </a:defRPr>
-            </a:lvl3pPr>
-            <a:lvl4pPr marL="1600200" indent="-228600" eaLnBrk="0" hangingPunct="0">
-              <a:defRPr>
-                <a:solidFill>
-                  <a:schemeClr val="tx1"/>
-                </a:solidFill>
-                <a:latin typeface="Arial" charset="0"/>
-              </a:defRPr>
-            </a:lvl4pPr>
-            <a:lvl5pPr marL="2057400" indent="-228600" eaLnBrk="0" hangingPunct="0">
-              <a:defRPr>
-                <a:solidFill>
-                  <a:schemeClr val="tx1"/>
-                </a:solidFill>
-                <a:latin typeface="Arial" charset="0"/>
-              </a:defRPr>
-            </a:lvl5pPr>
-            <a:lvl6pPr marL="2514600" indent="-228600" eaLnBrk="0" fontAlgn="base" hangingPunct="0">
-              <a:spcBef>
-                <a:spcPct val="0"/>
-              </a:spcBef>
-              <a:spcAft>
-                <a:spcPct val="0"/>
-              </a:spcAft>
-              <a:defRPr>
-                <a:solidFill>
-                  <a:schemeClr val="tx1"/>
-                </a:solidFill>
-                <a:latin typeface="Arial" charset="0"/>
-              </a:defRPr>
-            </a:lvl6pPr>
-            <a:lvl7pPr marL="2971800" indent="-228600" eaLnBrk="0" fontAlgn="base" hangingPunct="0">
-              <a:spcBef>
-                <a:spcPct val="0"/>
-              </a:spcBef>
-              <a:spcAft>
-                <a:spcPct val="0"/>
-              </a:spcAft>
-              <a:defRPr>
-                <a:solidFill>
-                  <a:schemeClr val="tx1"/>
-                </a:solidFill>
-                <a:latin typeface="Arial" charset="0"/>
-              </a:defRPr>
-            </a:lvl7pPr>
-            <a:lvl8pPr marL="3429000" indent="-228600" eaLnBrk="0" fontAlgn="base" hangingPunct="0">
-              <a:spcBef>
-                <a:spcPct val="0"/>
-              </a:spcBef>
-              <a:spcAft>
-                <a:spcPct val="0"/>
-              </a:spcAft>
-              <a:defRPr>
-                <a:solidFill>
-                  <a:schemeClr val="tx1"/>
-                </a:solidFill>
-                <a:latin typeface="Arial" charset="0"/>
-              </a:defRPr>
-            </a:lvl8pPr>
-            <a:lvl9pPr marL="3886200" indent="-228600" eaLnBrk="0" fontAlgn="base" hangingPunct="0">
-              <a:spcBef>
-                <a:spcPct val="0"/>
-              </a:spcBef>
-              <a:spcAft>
-                <a:spcPct val="0"/>
-              </a:spcAft>
-              <a:defRPr>
-                <a:solidFill>
-                  <a:schemeClr val="tx1"/>
-                </a:solidFill>
-                <a:latin typeface="Arial" charset="0"/>
-              </a:defRPr>
-            </a:lvl9pPr>
-          </a:lstStyle>
-          <a:p>
-            <a:pPr eaLnBrk="1" hangingPunct="1"/>
-            <a:r>
-              <a:rPr lang="en-US" smtClean="0"/>
-              <a:t>Stock Concept</a:t>
-            </a:r>
-            <a:endParaRPr lang="en-US" smtClean="0"/>
-          </a:p>
-        </p:txBody>
-      </p:sp>
-      <p:sp>
-        <p:nvSpPr>
-          <p:cNvPr id="12291" name="Slide Number Placeholder 4"/>
-          <p:cNvSpPr>
-            <a:spLocks noGrp="1"/>
-          </p:cNvSpPr>
-          <p:nvPr>
-            <p:ph type="sldNum" sz="quarter" idx="11"/>
-          </p:nvPr>
-        </p:nvSpPr>
-        <p:spPr>
-          <a:noFill/>
-          <a:ln/>
-          <a:extLst>
-            <a:ext uri="{909E8E84-426E-40DD-AFC4-6F175D3DCCD1}">
-              <a14:hiddenFill xmlns:a14="http://schemas.microsoft.com/office/drawing/2010/main">
-                <a:solidFill>
-                  <a:srgbClr val="FFFFFF"/>
-                </a:solidFill>
-              </a14:hiddenFill>
-            </a:ext>
-            <a:ext uri="{91240B29-F687-4F45-9708-019B960494DF}">
-              <a14:hiddenLine xmlns:a14="http://schemas.microsoft.com/office/drawing/2010/main" w="9525">
-                <a:solidFill>
-                  <a:srgbClr val="000000"/>
-                </a:solidFill>
-                <a:miter lim="800000"/>
-                <a:headEnd/>
-                <a:tailEnd/>
-              </a14:hiddenLine>
-            </a:ext>
-          </a:extLst>
-        </p:spPr>
-        <p:txBody>
-          <a:bodyPr/>
-          <a:lstStyle>
-            <a:lvl1pPr eaLnBrk="0" hangingPunct="0">
-              <a:defRPr>
-                <a:solidFill>
-                  <a:schemeClr val="tx1"/>
-                </a:solidFill>
-                <a:latin typeface="Arial" charset="0"/>
-              </a:defRPr>
-            </a:lvl1pPr>
-            <a:lvl2pPr marL="742950" indent="-285750" eaLnBrk="0" hangingPunct="0">
-              <a:defRPr>
-                <a:solidFill>
-                  <a:schemeClr val="tx1"/>
-                </a:solidFill>
-                <a:latin typeface="Arial" charset="0"/>
-              </a:defRPr>
-            </a:lvl2pPr>
-            <a:lvl3pPr marL="1143000" indent="-228600" eaLnBrk="0" hangingPunct="0">
-              <a:defRPr>
-                <a:solidFill>
-                  <a:schemeClr val="tx1"/>
-                </a:solidFill>
-                <a:latin typeface="Arial" charset="0"/>
-              </a:defRPr>
-            </a:lvl3pPr>
-            <a:lvl4pPr marL="1600200" indent="-228600" eaLnBrk="0" hangingPunct="0">
-              <a:defRPr>
-                <a:solidFill>
-                  <a:schemeClr val="tx1"/>
-                </a:solidFill>
-                <a:latin typeface="Arial" charset="0"/>
-              </a:defRPr>
-            </a:lvl4pPr>
-            <a:lvl5pPr marL="2057400" indent="-228600" eaLnBrk="0" hangingPunct="0">
-              <a:defRPr>
-                <a:solidFill>
-                  <a:schemeClr val="tx1"/>
-                </a:solidFill>
-                <a:latin typeface="Arial" charset="0"/>
-              </a:defRPr>
-            </a:lvl5pPr>
-            <a:lvl6pPr marL="2514600" indent="-228600" eaLnBrk="0" fontAlgn="base" hangingPunct="0">
-              <a:spcBef>
-                <a:spcPct val="0"/>
-              </a:spcBef>
-              <a:spcAft>
-                <a:spcPct val="0"/>
-              </a:spcAft>
-              <a:defRPr>
-                <a:solidFill>
-                  <a:schemeClr val="tx1"/>
-                </a:solidFill>
-                <a:latin typeface="Arial" charset="0"/>
-              </a:defRPr>
-            </a:lvl6pPr>
-            <a:lvl7pPr marL="2971800" indent="-228600" eaLnBrk="0" fontAlgn="base" hangingPunct="0">
-              <a:spcBef>
-                <a:spcPct val="0"/>
-              </a:spcBef>
-              <a:spcAft>
-                <a:spcPct val="0"/>
-              </a:spcAft>
-              <a:defRPr>
-                <a:solidFill>
-                  <a:schemeClr val="tx1"/>
-                </a:solidFill>
-                <a:latin typeface="Arial" charset="0"/>
-              </a:defRPr>
-            </a:lvl7pPr>
-            <a:lvl8pPr marL="3429000" indent="-228600" eaLnBrk="0" fontAlgn="base" hangingPunct="0">
-              <a:spcBef>
-                <a:spcPct val="0"/>
-              </a:spcBef>
-              <a:spcAft>
-                <a:spcPct val="0"/>
-              </a:spcAft>
-              <a:defRPr>
-                <a:solidFill>
-                  <a:schemeClr val="tx1"/>
-                </a:solidFill>
-                <a:latin typeface="Arial" charset="0"/>
-              </a:defRPr>
-            </a:lvl8pPr>
-            <a:lvl9pPr marL="3886200" indent="-228600" eaLnBrk="0" fontAlgn="base" hangingPunct="0">
-              <a:spcBef>
-                <a:spcPct val="0"/>
-              </a:spcBef>
-              <a:spcAft>
-                <a:spcPct val="0"/>
-              </a:spcAft>
-              <a:defRPr>
-                <a:solidFill>
-                  <a:schemeClr val="tx1"/>
-                </a:solidFill>
-                <a:latin typeface="Arial" charset="0"/>
-              </a:defRPr>
-            </a:lvl9pPr>
-          </a:lstStyle>
-          <a:p>
-            <a:pPr eaLnBrk="1" hangingPunct="1"/>
-            <a:fld id="{49AE2D1C-40B6-42A8-AAE0-913D246340EF}" type="slidenum">
-              <a:rPr lang="en-US" smtClean="0"/>
-              <a:pPr eaLnBrk="1" hangingPunct="1"/>
-              <a:t>3</a:t>
-            </a:fld>
-            <a:endParaRPr lang="en-US" smtClean="0"/>
-          </a:p>
-        </p:txBody>
-      </p:sp>
-      <p:sp>
-        <p:nvSpPr>
-          <p:cNvPr id="12292" name="Rectangle 2"/>
-          <p:cNvSpPr>
-            <a:spLocks noGrp="1" noChangeArrowheads="1"/>
-          </p:cNvSpPr>
-          <p:nvPr>
-            <p:ph type="title"/>
-          </p:nvPr>
-        </p:nvSpPr>
-        <p:spPr/>
-        <p:txBody>
-          <a:bodyPr/>
-          <a:lstStyle/>
-          <a:p>
-            <a:pPr eaLnBrk="1" hangingPunct="1"/>
-            <a:r>
-              <a:rPr lang="en-US" smtClean="0"/>
-              <a:t>Unit Stock</a:t>
-            </a:r>
-          </a:p>
-        </p:txBody>
-      </p:sp>
-      <p:sp>
-        <p:nvSpPr>
-          <p:cNvPr id="12293" name="Rectangle 3"/>
-          <p:cNvSpPr>
-            <a:spLocks noGrp="1" noChangeArrowheads="1"/>
-          </p:cNvSpPr>
-          <p:nvPr>
-            <p:ph type="body" idx="1"/>
-          </p:nvPr>
-        </p:nvSpPr>
-        <p:spPr/>
-        <p:txBody>
-          <a:bodyPr/>
-          <a:lstStyle/>
-          <a:p>
-            <a:pPr eaLnBrk="1" hangingPunct="1">
-              <a:buFontTx/>
-              <a:buNone/>
-            </a:pPr>
-            <a:r>
-              <a:rPr lang="en-US" dirty="0" smtClean="0"/>
-              <a:t>	“</a:t>
-            </a:r>
-            <a:r>
-              <a:rPr lang="en-US" dirty="0" smtClean="0">
-                <a:solidFill>
-                  <a:schemeClr val="bg1">
-                    <a:lumMod val="50000"/>
-                  </a:schemeClr>
-                </a:solidFill>
-              </a:rPr>
-              <a:t>A unit stock can be theoretically described as a group of individuals of the same species whose gains by immigration and whose losses by emigration, if any, are negligible in relation to the rates of growth and mortality. A unit stock is essentially a self-contained population with its own spawning area. </a:t>
-            </a:r>
-            <a:r>
-              <a:rPr lang="en-US" dirty="0" smtClean="0"/>
-              <a:t>It is isolated and fishing upon one unit stock has no effect upon the individuals of other stocks.” </a:t>
-            </a:r>
-            <a:r>
-              <a:rPr lang="en-US" sz="2400" i="1" dirty="0" smtClean="0">
-                <a:solidFill>
-                  <a:schemeClr val="accent2"/>
-                </a:solidFill>
-              </a:rPr>
-              <a:t>-- Holden and </a:t>
-            </a:r>
-            <a:r>
-              <a:rPr lang="en-US" sz="2400" i="1" dirty="0" err="1" smtClean="0">
-                <a:solidFill>
-                  <a:schemeClr val="accent2"/>
-                </a:solidFill>
-              </a:rPr>
-              <a:t>Raitt</a:t>
-            </a:r>
-            <a:r>
-              <a:rPr lang="en-US" sz="2400" i="1" dirty="0" smtClean="0">
-                <a:solidFill>
-                  <a:schemeClr val="accent2"/>
-                </a:solidFill>
-              </a:rPr>
-              <a:t>, 1974</a:t>
-            </a:r>
-          </a:p>
-        </p:txBody>
-      </p:sp>
-    </p:spTree>
-    <p:extLst>
-      <p:ext uri="{BB962C8B-B14F-4D97-AF65-F5344CB8AC3E}">
-        <p14:creationId xmlns:p14="http://schemas.microsoft.com/office/powerpoint/2010/main" val="3499895712"/>
-      </p:ext>
-    </p:extLst>
-  </p:cSld>
-  <p:clrMapOvr>
-    <a:masterClrMapping/>
-  </p:clrMapOvr>
-  <p:transition/>
-  <p:timing>
-    <p:tnLst>
-      <p:par>
-        <p:cTn id="1" dur="indefinite" restart="never" nodeType="tmRoot"/>
-      </p:par>
-    </p:tnLst>
-  </p:timing>
-</p:sld>
-</file>
-
-<file path=ppt/slides/slide4.xml><?xml version="1.0" encoding="utf-8"?>
-<p:sld xmlns:a="http://schemas.openxmlformats.org/drawingml/2006/main" xmlns:r="http://schemas.openxmlformats.org/officeDocument/2006/relationships" xmlns:p="http://schemas.openxmlformats.org/presentationml/2006/main">
-  <p:cSld>
-    <p:spTree>
-      <p:nvGrpSpPr>
-        <p:cNvPr id="1" name=""/>
-        <p:cNvGrpSpPr/>
-        <p:nvPr/>
-      </p:nvGrpSpPr>
-      <p:grpSpPr>
-        <a:xfrm>
-          <a:off x="0" y="0"/>
-          <a:ext cx="0" cy="0"/>
-          <a:chOff x="0" y="0"/>
-          <a:chExt cx="0" cy="0"/>
-        </a:xfrm>
-      </p:grpSpPr>
-      <p:sp>
-        <p:nvSpPr>
-          <p:cNvPr id="14338" name="Footer Placeholder 3"/>
-          <p:cNvSpPr>
-            <a:spLocks noGrp="1"/>
-          </p:cNvSpPr>
-          <p:nvPr>
-            <p:ph type="ftr" sz="quarter" idx="10"/>
-          </p:nvPr>
-        </p:nvSpPr>
-        <p:spPr>
-          <a:noFill/>
-          <a:ln/>
-          <a:extLst>
-            <a:ext uri="{909E8E84-426E-40DD-AFC4-6F175D3DCCD1}">
-              <a14:hiddenFill xmlns:a14="http://schemas.microsoft.com/office/drawing/2010/main">
-                <a:solidFill>
-                  <a:srgbClr val="FFFFFF"/>
-                </a:solidFill>
-              </a14:hiddenFill>
-            </a:ext>
-            <a:ext uri="{91240B29-F687-4F45-9708-019B960494DF}">
-              <a14:hiddenLine xmlns:a14="http://schemas.microsoft.com/office/drawing/2010/main" w="9525">
-                <a:solidFill>
-                  <a:srgbClr val="000000"/>
-                </a:solidFill>
-                <a:miter lim="800000"/>
-                <a:headEnd/>
-                <a:tailEnd/>
-              </a14:hiddenLine>
-            </a:ext>
-          </a:extLst>
-        </p:spPr>
-        <p:txBody>
-          <a:bodyPr/>
-          <a:lstStyle>
-            <a:lvl1pPr eaLnBrk="0" hangingPunct="0">
-              <a:defRPr>
-                <a:solidFill>
-                  <a:schemeClr val="tx1"/>
-                </a:solidFill>
-                <a:latin typeface="Arial" charset="0"/>
-              </a:defRPr>
-            </a:lvl1pPr>
-            <a:lvl2pPr marL="742950" indent="-285750" eaLnBrk="0" hangingPunct="0">
-              <a:defRPr>
-                <a:solidFill>
-                  <a:schemeClr val="tx1"/>
-                </a:solidFill>
-                <a:latin typeface="Arial" charset="0"/>
-              </a:defRPr>
-            </a:lvl2pPr>
-            <a:lvl3pPr marL="1143000" indent="-228600" eaLnBrk="0" hangingPunct="0">
-              <a:defRPr>
-                <a:solidFill>
-                  <a:schemeClr val="tx1"/>
-                </a:solidFill>
-                <a:latin typeface="Arial" charset="0"/>
-              </a:defRPr>
-            </a:lvl3pPr>
-            <a:lvl4pPr marL="1600200" indent="-228600" eaLnBrk="0" hangingPunct="0">
-              <a:defRPr>
-                <a:solidFill>
-                  <a:schemeClr val="tx1"/>
-                </a:solidFill>
-                <a:latin typeface="Arial" charset="0"/>
-              </a:defRPr>
-            </a:lvl4pPr>
-            <a:lvl5pPr marL="2057400" indent="-228600" eaLnBrk="0" hangingPunct="0">
-              <a:defRPr>
-                <a:solidFill>
-                  <a:schemeClr val="tx1"/>
-                </a:solidFill>
-                <a:latin typeface="Arial" charset="0"/>
-              </a:defRPr>
-            </a:lvl5pPr>
-            <a:lvl6pPr marL="2514600" indent="-228600" eaLnBrk="0" fontAlgn="base" hangingPunct="0">
-              <a:spcBef>
-                <a:spcPct val="0"/>
-              </a:spcBef>
-              <a:spcAft>
-                <a:spcPct val="0"/>
-              </a:spcAft>
-              <a:defRPr>
-                <a:solidFill>
-                  <a:schemeClr val="tx1"/>
-                </a:solidFill>
-                <a:latin typeface="Arial" charset="0"/>
-              </a:defRPr>
-            </a:lvl6pPr>
-            <a:lvl7pPr marL="2971800" indent="-228600" eaLnBrk="0" fontAlgn="base" hangingPunct="0">
-              <a:spcBef>
-                <a:spcPct val="0"/>
-              </a:spcBef>
-              <a:spcAft>
-                <a:spcPct val="0"/>
-              </a:spcAft>
-              <a:defRPr>
-                <a:solidFill>
-                  <a:schemeClr val="tx1"/>
-                </a:solidFill>
-                <a:latin typeface="Arial" charset="0"/>
-              </a:defRPr>
-            </a:lvl7pPr>
-            <a:lvl8pPr marL="3429000" indent="-228600" eaLnBrk="0" fontAlgn="base" hangingPunct="0">
-              <a:spcBef>
-                <a:spcPct val="0"/>
-              </a:spcBef>
-              <a:spcAft>
-                <a:spcPct val="0"/>
-              </a:spcAft>
-              <a:defRPr>
-                <a:solidFill>
-                  <a:schemeClr val="tx1"/>
-                </a:solidFill>
-                <a:latin typeface="Arial" charset="0"/>
-              </a:defRPr>
-            </a:lvl8pPr>
-            <a:lvl9pPr marL="3886200" indent="-228600" eaLnBrk="0" fontAlgn="base" hangingPunct="0">
-              <a:spcBef>
-                <a:spcPct val="0"/>
-              </a:spcBef>
-              <a:spcAft>
-                <a:spcPct val="0"/>
-              </a:spcAft>
-              <a:defRPr>
-                <a:solidFill>
-                  <a:schemeClr val="tx1"/>
-                </a:solidFill>
-                <a:latin typeface="Arial" charset="0"/>
-              </a:defRPr>
-            </a:lvl9pPr>
-          </a:lstStyle>
-          <a:p>
-            <a:pPr eaLnBrk="1" hangingPunct="1"/>
-            <a:r>
-              <a:rPr lang="en-US" smtClean="0"/>
-              <a:t>Stock Concept</a:t>
-            </a:r>
-            <a:endParaRPr lang="en-US" smtClean="0"/>
-          </a:p>
-        </p:txBody>
-      </p:sp>
-      <p:sp>
-        <p:nvSpPr>
-          <p:cNvPr id="14339" name="Slide Number Placeholder 4"/>
-          <p:cNvSpPr>
-            <a:spLocks noGrp="1"/>
-          </p:cNvSpPr>
-          <p:nvPr>
-            <p:ph type="sldNum" sz="quarter" idx="11"/>
-          </p:nvPr>
-        </p:nvSpPr>
-        <p:spPr>
-          <a:noFill/>
-          <a:ln/>
-          <a:extLst>
-            <a:ext uri="{909E8E84-426E-40DD-AFC4-6F175D3DCCD1}">
-              <a14:hiddenFill xmlns:a14="http://schemas.microsoft.com/office/drawing/2010/main">
-                <a:solidFill>
-                  <a:srgbClr val="FFFFFF"/>
-                </a:solidFill>
-              </a14:hiddenFill>
-            </a:ext>
-            <a:ext uri="{91240B29-F687-4F45-9708-019B960494DF}">
-              <a14:hiddenLine xmlns:a14="http://schemas.microsoft.com/office/drawing/2010/main" w="9525">
-                <a:solidFill>
-                  <a:srgbClr val="000000"/>
-                </a:solidFill>
-                <a:miter lim="800000"/>
-                <a:headEnd/>
-                <a:tailEnd/>
-              </a14:hiddenLine>
-            </a:ext>
-          </a:extLst>
-        </p:spPr>
-        <p:txBody>
-          <a:bodyPr/>
-          <a:lstStyle>
-            <a:lvl1pPr eaLnBrk="0" hangingPunct="0">
-              <a:defRPr>
-                <a:solidFill>
-                  <a:schemeClr val="tx1"/>
-                </a:solidFill>
-                <a:latin typeface="Arial" charset="0"/>
-              </a:defRPr>
-            </a:lvl1pPr>
-            <a:lvl2pPr marL="742950" indent="-285750" eaLnBrk="0" hangingPunct="0">
-              <a:defRPr>
-                <a:solidFill>
-                  <a:schemeClr val="tx1"/>
-                </a:solidFill>
-                <a:latin typeface="Arial" charset="0"/>
-              </a:defRPr>
-            </a:lvl2pPr>
-            <a:lvl3pPr marL="1143000" indent="-228600" eaLnBrk="0" hangingPunct="0">
-              <a:defRPr>
-                <a:solidFill>
-                  <a:schemeClr val="tx1"/>
-                </a:solidFill>
-                <a:latin typeface="Arial" charset="0"/>
-              </a:defRPr>
-            </a:lvl3pPr>
-            <a:lvl4pPr marL="1600200" indent="-228600" eaLnBrk="0" hangingPunct="0">
-              <a:defRPr>
-                <a:solidFill>
-                  <a:schemeClr val="tx1"/>
-                </a:solidFill>
-                <a:latin typeface="Arial" charset="0"/>
-              </a:defRPr>
-            </a:lvl4pPr>
-            <a:lvl5pPr marL="2057400" indent="-228600" eaLnBrk="0" hangingPunct="0">
-              <a:defRPr>
-                <a:solidFill>
-                  <a:schemeClr val="tx1"/>
-                </a:solidFill>
-                <a:latin typeface="Arial" charset="0"/>
-              </a:defRPr>
-            </a:lvl5pPr>
-            <a:lvl6pPr marL="2514600" indent="-228600" eaLnBrk="0" fontAlgn="base" hangingPunct="0">
-              <a:spcBef>
-                <a:spcPct val="0"/>
-              </a:spcBef>
-              <a:spcAft>
-                <a:spcPct val="0"/>
-              </a:spcAft>
-              <a:defRPr>
-                <a:solidFill>
-                  <a:schemeClr val="tx1"/>
-                </a:solidFill>
-                <a:latin typeface="Arial" charset="0"/>
-              </a:defRPr>
-            </a:lvl6pPr>
-            <a:lvl7pPr marL="2971800" indent="-228600" eaLnBrk="0" fontAlgn="base" hangingPunct="0">
-              <a:spcBef>
-                <a:spcPct val="0"/>
-              </a:spcBef>
-              <a:spcAft>
-                <a:spcPct val="0"/>
-              </a:spcAft>
-              <a:defRPr>
-                <a:solidFill>
-                  <a:schemeClr val="tx1"/>
-                </a:solidFill>
-                <a:latin typeface="Arial" charset="0"/>
-              </a:defRPr>
-            </a:lvl7pPr>
-            <a:lvl8pPr marL="3429000" indent="-228600" eaLnBrk="0" fontAlgn="base" hangingPunct="0">
-              <a:spcBef>
-                <a:spcPct val="0"/>
-              </a:spcBef>
-              <a:spcAft>
-                <a:spcPct val="0"/>
-              </a:spcAft>
-              <a:defRPr>
-                <a:solidFill>
-                  <a:schemeClr val="tx1"/>
-                </a:solidFill>
-                <a:latin typeface="Arial" charset="0"/>
-              </a:defRPr>
-            </a:lvl8pPr>
-            <a:lvl9pPr marL="3886200" indent="-228600" eaLnBrk="0" fontAlgn="base" hangingPunct="0">
-              <a:spcBef>
-                <a:spcPct val="0"/>
-              </a:spcBef>
-              <a:spcAft>
-                <a:spcPct val="0"/>
-              </a:spcAft>
-              <a:defRPr>
-                <a:solidFill>
-                  <a:schemeClr val="tx1"/>
-                </a:solidFill>
-                <a:latin typeface="Arial" charset="0"/>
-              </a:defRPr>
-            </a:lvl9pPr>
-          </a:lstStyle>
-          <a:p>
-            <a:pPr eaLnBrk="1" hangingPunct="1"/>
-            <a:fld id="{5A885CEC-3611-4CCF-8C1A-8034FD18DDFD}" type="slidenum">
-              <a:rPr lang="en-US" smtClean="0"/>
-              <a:pPr eaLnBrk="1" hangingPunct="1"/>
-              <a:t>4</a:t>
-            </a:fld>
-            <a:endParaRPr lang="en-US" smtClean="0"/>
-          </a:p>
-        </p:txBody>
-      </p:sp>
-      <p:sp>
-        <p:nvSpPr>
-          <p:cNvPr id="14340" name="Rectangle 2"/>
-          <p:cNvSpPr>
-            <a:spLocks noGrp="1" noChangeArrowheads="1"/>
-          </p:cNvSpPr>
-          <p:nvPr>
-            <p:ph type="title"/>
-          </p:nvPr>
-        </p:nvSpPr>
-        <p:spPr/>
-        <p:txBody>
-          <a:bodyPr/>
-          <a:lstStyle/>
-          <a:p>
-            <a:pPr eaLnBrk="1" hangingPunct="1"/>
-            <a:r>
-              <a:rPr lang="en-US" smtClean="0"/>
-              <a:t>Unit Stock</a:t>
-            </a:r>
-          </a:p>
-        </p:txBody>
-      </p:sp>
-      <p:sp>
-        <p:nvSpPr>
-          <p:cNvPr id="29699" name="Rectangle 3"/>
-          <p:cNvSpPr>
-            <a:spLocks noGrp="1" noChangeArrowheads="1"/>
-          </p:cNvSpPr>
-          <p:nvPr>
-            <p:ph type="body" idx="1"/>
-          </p:nvPr>
-        </p:nvSpPr>
-        <p:spPr>
-          <a:xfrm>
-            <a:off x="457200" y="1143000"/>
-            <a:ext cx="8534400" cy="5334000"/>
-          </a:xfrm>
-        </p:spPr>
-        <p:txBody>
-          <a:bodyPr/>
-          <a:lstStyle/>
-          <a:p>
-            <a:pPr eaLnBrk="1" hangingPunct="1"/>
-            <a:r>
-              <a:rPr lang="en-US" dirty="0" smtClean="0"/>
-              <a:t>Closed, confined.</a:t>
-            </a:r>
-          </a:p>
-          <a:p>
-            <a:pPr eaLnBrk="1" hangingPunct="1"/>
-            <a:endParaRPr lang="en-US" dirty="0" smtClean="0"/>
-          </a:p>
-          <a:p>
-            <a:pPr eaLnBrk="1" hangingPunct="1"/>
-            <a:r>
-              <a:rPr lang="en-US" dirty="0" smtClean="0"/>
-              <a:t>Identifies specific unit for management and unit of analysis (i.e., statistical population).</a:t>
-            </a:r>
-          </a:p>
-          <a:p>
-            <a:pPr eaLnBrk="1" hangingPunct="1"/>
-            <a:endParaRPr lang="en-US" dirty="0" smtClean="0"/>
-          </a:p>
-          <a:p>
-            <a:pPr eaLnBrk="1" hangingPunct="1"/>
-            <a:r>
-              <a:rPr lang="en-US" dirty="0" smtClean="0"/>
-              <a:t>Difficult to define in some instances.</a:t>
-            </a:r>
-          </a:p>
-          <a:p>
-            <a:pPr eaLnBrk="1" hangingPunct="1"/>
-            <a:endParaRPr lang="en-US" dirty="0" smtClean="0"/>
-          </a:p>
-          <a:p>
-            <a:pPr eaLnBrk="1" hangingPunct="1"/>
-            <a:r>
-              <a:rPr lang="en-US" dirty="0" smtClean="0"/>
-              <a:t>Too confined!? (what about watershed or system-level management)</a:t>
-            </a:r>
-          </a:p>
-        </p:txBody>
-      </p:sp>
-    </p:spTree>
-    <p:extLst>
-      <p:ext uri="{BB962C8B-B14F-4D97-AF65-F5344CB8AC3E}">
-        <p14:creationId xmlns:p14="http://schemas.microsoft.com/office/powerpoint/2010/main" val="143397338"/>
+        <p14:creationId xmlns:p14="http://schemas.microsoft.com/office/powerpoint/2010/main" val="2658180733"/>
       </p:ext>
     </p:extLst>
   </p:cSld>
@@ -5605,13 +4570,13 @@
               <p:cTn id="2" dur="indefinite" nodeType="mainSeq">
                 <p:childTnLst>
                   <p:par>
-                    <p:cTn id="3" fill="hold" nodeType="clickPar">
+                    <p:cTn id="3" fill="hold">
                       <p:stCondLst>
                         <p:cond delay="indefinite"/>
                       </p:stCondLst>
                       <p:childTnLst>
                         <p:par>
-                          <p:cTn id="4" fill="hold" nodeType="withGroup">
+                          <p:cTn id="4" fill="hold">
                             <p:stCondLst>
                               <p:cond delay="0"/>
                             </p:stCondLst>
@@ -5630,107 +4595,9 @@
                                           </p:stCondLst>
                                         </p:cTn>
                                         <p:tgtEl>
-                                          <p:spTgt spid="29699">
+                                          <p:spTgt spid="12293">
                                             <p:txEl>
                                               <p:pRg st="2" end="2"/>
-                                            </p:txEl>
-                                          </p:spTgt>
-                                        </p:tgtEl>
-                                        <p:attrNameLst>
-                                          <p:attrName>style.visibility</p:attrName>
-                                        </p:attrNameLst>
-                                      </p:cBhvr>
-                                      <p:to>
-                                        <p:strVal val="visible"/>
-                                      </p:to>
-                                    </p:set>
-                                  </p:childTnLst>
-                                </p:cTn>
-                              </p:par>
-                            </p:childTnLst>
-                          </p:cTn>
-                        </p:par>
-                      </p:childTnLst>
-                    </p:cTn>
-                  </p:par>
-                  <p:par>
-                    <p:cTn id="7" fill="hold">
-                      <p:stCondLst>
-                        <p:cond delay="indefinite"/>
-                      </p:stCondLst>
-                      <p:childTnLst>
-                        <p:par>
-                          <p:cTn id="8" fill="hold">
-                            <p:stCondLst>
-                              <p:cond delay="0"/>
-                            </p:stCondLst>
-                            <p:childTnLst>
-                              <p:par>
-                                <p:cTn id="9" presetID="1" presetClass="entr" presetSubtype="0" fill="hold" grpId="0" nodeType="clickEffect">
-                                  <p:stCondLst>
-                                    <p:cond delay="0"/>
-                                  </p:stCondLst>
-                                  <p:childTnLst>
-                                    <p:set>
-                                      <p:cBhvr>
-                                        <p:cTn id="10" dur="1" fill="hold">
-                                          <p:stCondLst>
-                                            <p:cond delay="0"/>
-                                          </p:stCondLst>
-                                        </p:cTn>
-                                        <p:tgtEl>
-                                          <p:spTgt spid="29699">
-                                            <p:txEl>
-                                              <p:pRg st="4" end="4"/>
-                                            </p:txEl>
-                                          </p:spTgt>
-                                        </p:tgtEl>
-                                        <p:attrNameLst>
-                                          <p:attrName>style.visibility</p:attrName>
-                                        </p:attrNameLst>
-                                      </p:cBhvr>
-                                      <p:to>
-                                        <p:strVal val="visible"/>
-                                      </p:to>
-                                    </p:set>
-                                  </p:childTnLst>
-                                </p:cTn>
-                              </p:par>
-                            </p:childTnLst>
-                          </p:cTn>
-                        </p:par>
-                      </p:childTnLst>
-                    </p:cTn>
-                  </p:par>
-                  <p:par>
-                    <p:cTn id="11" fill="hold">
-                      <p:stCondLst>
-                        <p:cond delay="indefinite"/>
-                      </p:stCondLst>
-                      <p:childTnLst>
-                        <p:par>
-                          <p:cTn id="12" fill="hold">
-                            <p:stCondLst>
-                              <p:cond delay="0"/>
-                            </p:stCondLst>
-                            <p:childTnLst>
-                              <p:par>
-                                <p:cTn id="13" presetID="1" presetClass="entr" presetSubtype="0" fill="hold" grpId="0" nodeType="clickEffect">
-                                  <p:stCondLst>
-                                    <p:cond delay="0"/>
-                                  </p:stCondLst>
-                                  <p:childTnLst>
-                                    <p:set>
-                                      <p:cBhvr>
-                                        <p:cTn id="14" dur="1" fill="hold">
-                                          <p:stCondLst>
-                                            <p:cond delay="0"/>
-                                          </p:stCondLst>
-                                        </p:cTn>
-                                        <p:tgtEl>
-                                          <p:spTgt spid="29699">
-                                            <p:txEl>
-                                              <p:pRg st="6" end="6"/>
                                             </p:txEl>
                                           </p:spTgt>
                                         </p:tgtEl>
@@ -5773,13 +4640,13 @@
       </p:par>
     </p:tnLst>
     <p:bldLst>
-      <p:bldP spid="29699" grpId="0" build="p"/>
+      <p:bldP spid="12293" grpId="0" uiExpand="1" build="p"/>
     </p:bldLst>
   </p:timing>
 </p:sld>
 </file>
 
-<file path=ppt/slides/slide5.xml><?xml version="1.0" encoding="utf-8"?>
+<file path=ppt/slides/slide2.xml><?xml version="1.0" encoding="utf-8"?>
 <p:sld xmlns:a="http://schemas.openxmlformats.org/drawingml/2006/main" xmlns:r="http://schemas.openxmlformats.org/officeDocument/2006/relationships" xmlns:p="http://schemas.openxmlformats.org/presentationml/2006/main">
   <p:cSld>
     <p:spTree>
@@ -5873,7 +4740,7 @@
               <a:pPr>
                 <a:defRPr/>
               </a:pPr>
-              <a:t>5</a:t>
+              <a:t>2</a:t>
             </a:fld>
             <a:endParaRPr lang="en-US"/>
           </a:p>
@@ -7213,7 +6080,7 @@
 </p:sld>
 </file>
 
-<file path=ppt/slides/slide6.xml><?xml version="1.0" encoding="utf-8"?>
+<file path=ppt/slides/slide3.xml><?xml version="1.0" encoding="utf-8"?>
 <p:sld xmlns:a="http://schemas.openxmlformats.org/drawingml/2006/main" xmlns:r="http://schemas.openxmlformats.org/officeDocument/2006/relationships" xmlns:p="http://schemas.openxmlformats.org/presentationml/2006/main">
   <p:cSld>
     <p:spTree>
@@ -7307,7 +6174,7 @@
               <a:pPr>
                 <a:defRPr/>
               </a:pPr>
-              <a:t>6</a:t>
+              <a:t>3</a:t>
             </a:fld>
             <a:endParaRPr lang="en-US"/>
           </a:p>
@@ -9356,6 +8223,668 @@
       <p:bldP spid="60" grpId="0"/>
       <p:bldP spid="60" grpId="1"/>
     </p:bldLst>
+  </p:timing>
+</p:sld>
+</file>
+
+<file path=ppt/slides/slide4.xml><?xml version="1.0" encoding="utf-8"?>
+<p:sld xmlns:a="http://schemas.openxmlformats.org/drawingml/2006/main" xmlns:r="http://schemas.openxmlformats.org/officeDocument/2006/relationships" xmlns:p="http://schemas.openxmlformats.org/presentationml/2006/main">
+  <p:cSld>
+    <p:spTree>
+      <p:nvGrpSpPr>
+        <p:cNvPr id="1" name=""/>
+        <p:cNvGrpSpPr/>
+        <p:nvPr/>
+      </p:nvGrpSpPr>
+      <p:grpSpPr>
+        <a:xfrm>
+          <a:off x="0" y="0"/>
+          <a:ext cx="0" cy="0"/>
+          <a:chOff x="0" y="0"/>
+          <a:chExt cx="0" cy="0"/>
+        </a:xfrm>
+      </p:grpSpPr>
+      <p:sp>
+        <p:nvSpPr>
+          <p:cNvPr id="2" name="Title 1"/>
+          <p:cNvSpPr>
+            <a:spLocks noGrp="1"/>
+          </p:cNvSpPr>
+          <p:nvPr>
+            <p:ph type="title"/>
+          </p:nvPr>
+        </p:nvSpPr>
+        <p:spPr/>
+        <p:txBody>
+          <a:bodyPr/>
+          <a:lstStyle/>
+          <a:p>
+            <a:r>
+              <a:rPr lang="en-US" dirty="0" smtClean="0"/>
+              <a:t>Stock Concept Example</a:t>
+            </a:r>
+            <a:endParaRPr lang="en-US" dirty="0"/>
+          </a:p>
+        </p:txBody>
+      </p:sp>
+      <p:sp>
+        <p:nvSpPr>
+          <p:cNvPr id="4" name="Footer Placeholder 3"/>
+          <p:cNvSpPr>
+            <a:spLocks noGrp="1"/>
+          </p:cNvSpPr>
+          <p:nvPr>
+            <p:ph type="ftr" sz="quarter" idx="10"/>
+          </p:nvPr>
+        </p:nvSpPr>
+        <p:spPr/>
+        <p:txBody>
+          <a:bodyPr/>
+          <a:lstStyle/>
+          <a:p>
+            <a:pPr>
+              <a:defRPr/>
+            </a:pPr>
+            <a:r>
+              <a:rPr lang="en-US" smtClean="0"/>
+              <a:t>Stock Concept</a:t>
+            </a:r>
+            <a:endParaRPr lang="en-US"/>
+          </a:p>
+        </p:txBody>
+      </p:sp>
+      <p:sp>
+        <p:nvSpPr>
+          <p:cNvPr id="5" name="Slide Number Placeholder 4"/>
+          <p:cNvSpPr>
+            <a:spLocks noGrp="1"/>
+          </p:cNvSpPr>
+          <p:nvPr>
+            <p:ph type="sldNum" sz="quarter" idx="11"/>
+          </p:nvPr>
+        </p:nvSpPr>
+        <p:spPr/>
+        <p:txBody>
+          <a:bodyPr/>
+          <a:lstStyle/>
+          <a:p>
+            <a:pPr>
+              <a:defRPr/>
+            </a:pPr>
+            <a:fld id="{A4C5663D-8A97-4D07-AE54-B897400713C4}" type="slidenum">
+              <a:rPr lang="en-US" smtClean="0"/>
+              <a:pPr>
+                <a:defRPr/>
+              </a:pPr>
+              <a:t>4</a:t>
+            </a:fld>
+            <a:endParaRPr lang="en-US"/>
+          </a:p>
+        </p:txBody>
+      </p:sp>
+      <p:pic>
+        <p:nvPicPr>
+          <p:cNvPr id="6" name="Picture 5"/>
+          <p:cNvPicPr>
+            <a:picLocks noChangeAspect="1"/>
+          </p:cNvPicPr>
+          <p:nvPr/>
+        </p:nvPicPr>
+        <p:blipFill>
+          <a:blip r:embed="rId2"/>
+          <a:stretch>
+            <a:fillRect/>
+          </a:stretch>
+        </p:blipFill>
+        <p:spPr>
+          <a:xfrm>
+            <a:off x="1380816" y="980209"/>
+            <a:ext cx="6380779" cy="4797425"/>
+          </a:xfrm>
+          <a:prstGeom prst="rect">
+            <a:avLst/>
+          </a:prstGeom>
+        </p:spPr>
+      </p:pic>
+      <p:pic>
+        <p:nvPicPr>
+          <p:cNvPr id="8" name="Picture 7"/>
+          <p:cNvPicPr>
+            <a:picLocks noChangeAspect="1"/>
+          </p:cNvPicPr>
+          <p:nvPr/>
+        </p:nvPicPr>
+        <p:blipFill>
+          <a:blip r:embed="rId3"/>
+          <a:stretch>
+            <a:fillRect/>
+          </a:stretch>
+        </p:blipFill>
+        <p:spPr>
+          <a:xfrm>
+            <a:off x="380691" y="6065374"/>
+            <a:ext cx="8077509" cy="716426"/>
+          </a:xfrm>
+          <a:prstGeom prst="rect">
+            <a:avLst/>
+          </a:prstGeom>
+        </p:spPr>
+      </p:pic>
+    </p:spTree>
+    <p:extLst>
+      <p:ext uri="{BB962C8B-B14F-4D97-AF65-F5344CB8AC3E}">
+        <p14:creationId xmlns:p14="http://schemas.microsoft.com/office/powerpoint/2010/main" val="3907378598"/>
+      </p:ext>
+    </p:extLst>
+  </p:cSld>
+  <p:clrMapOvr>
+    <a:masterClrMapping/>
+  </p:clrMapOvr>
+  <p:timing>
+    <p:tnLst>
+      <p:par>
+        <p:cTn id="1" dur="indefinite" restart="never" nodeType="tmRoot"/>
+      </p:par>
+    </p:tnLst>
+  </p:timing>
+</p:sld>
+</file>
+
+<file path=ppt/slides/slide5.xml><?xml version="1.0" encoding="utf-8"?>
+<p:sld xmlns:a="http://schemas.openxmlformats.org/drawingml/2006/main" xmlns:r="http://schemas.openxmlformats.org/officeDocument/2006/relationships" xmlns:p="http://schemas.openxmlformats.org/presentationml/2006/main">
+  <p:cSld>
+    <p:spTree>
+      <p:nvGrpSpPr>
+        <p:cNvPr id="1" name=""/>
+        <p:cNvGrpSpPr/>
+        <p:nvPr/>
+      </p:nvGrpSpPr>
+      <p:grpSpPr>
+        <a:xfrm>
+          <a:off x="0" y="0"/>
+          <a:ext cx="0" cy="0"/>
+          <a:chOff x="0" y="0"/>
+          <a:chExt cx="0" cy="0"/>
+        </a:xfrm>
+      </p:grpSpPr>
+      <p:sp>
+        <p:nvSpPr>
+          <p:cNvPr id="2" name="Title 1"/>
+          <p:cNvSpPr>
+            <a:spLocks noGrp="1"/>
+          </p:cNvSpPr>
+          <p:nvPr>
+            <p:ph type="title"/>
+          </p:nvPr>
+        </p:nvSpPr>
+        <p:spPr/>
+        <p:txBody>
+          <a:bodyPr/>
+          <a:lstStyle/>
+          <a:p>
+            <a:r>
+              <a:rPr lang="en-US" dirty="0" smtClean="0"/>
+              <a:t>Stock Concept Example</a:t>
+            </a:r>
+            <a:endParaRPr lang="en-US" dirty="0"/>
+          </a:p>
+        </p:txBody>
+      </p:sp>
+      <p:sp>
+        <p:nvSpPr>
+          <p:cNvPr id="4" name="Footer Placeholder 3"/>
+          <p:cNvSpPr>
+            <a:spLocks noGrp="1"/>
+          </p:cNvSpPr>
+          <p:nvPr>
+            <p:ph type="ftr" sz="quarter" idx="10"/>
+          </p:nvPr>
+        </p:nvSpPr>
+        <p:spPr/>
+        <p:txBody>
+          <a:bodyPr/>
+          <a:lstStyle/>
+          <a:p>
+            <a:pPr>
+              <a:defRPr/>
+            </a:pPr>
+            <a:r>
+              <a:rPr lang="en-US" smtClean="0"/>
+              <a:t>Stock Concept</a:t>
+            </a:r>
+            <a:endParaRPr lang="en-US"/>
+          </a:p>
+        </p:txBody>
+      </p:sp>
+      <p:sp>
+        <p:nvSpPr>
+          <p:cNvPr id="5" name="Slide Number Placeholder 4"/>
+          <p:cNvSpPr>
+            <a:spLocks noGrp="1"/>
+          </p:cNvSpPr>
+          <p:nvPr>
+            <p:ph type="sldNum" sz="quarter" idx="11"/>
+          </p:nvPr>
+        </p:nvSpPr>
+        <p:spPr/>
+        <p:txBody>
+          <a:bodyPr/>
+          <a:lstStyle/>
+          <a:p>
+            <a:pPr>
+              <a:defRPr/>
+            </a:pPr>
+            <a:fld id="{A4C5663D-8A97-4D07-AE54-B897400713C4}" type="slidenum">
+              <a:rPr lang="en-US" smtClean="0"/>
+              <a:pPr>
+                <a:defRPr/>
+              </a:pPr>
+              <a:t>5</a:t>
+            </a:fld>
+            <a:endParaRPr lang="en-US"/>
+          </a:p>
+        </p:txBody>
+      </p:sp>
+      <p:pic>
+        <p:nvPicPr>
+          <p:cNvPr id="3" name="Picture 2"/>
+          <p:cNvPicPr>
+            <a:picLocks noChangeAspect="1"/>
+          </p:cNvPicPr>
+          <p:nvPr/>
+        </p:nvPicPr>
+        <p:blipFill>
+          <a:blip r:embed="rId2"/>
+          <a:stretch>
+            <a:fillRect/>
+          </a:stretch>
+        </p:blipFill>
+        <p:spPr>
+          <a:xfrm>
+            <a:off x="65088" y="990600"/>
+            <a:ext cx="8986477" cy="5503147"/>
+          </a:xfrm>
+          <a:prstGeom prst="rect">
+            <a:avLst/>
+          </a:prstGeom>
+        </p:spPr>
+      </p:pic>
+      <p:sp>
+        <p:nvSpPr>
+          <p:cNvPr id="8" name="Rectangle 7"/>
+          <p:cNvSpPr/>
+          <p:nvPr/>
+        </p:nvSpPr>
+        <p:spPr>
+          <a:xfrm>
+            <a:off x="3276600" y="990600"/>
+            <a:ext cx="5486400" cy="4724400"/>
+          </a:xfrm>
+          <a:prstGeom prst="rect">
+            <a:avLst/>
+          </a:prstGeom>
+          <a:solidFill>
+            <a:schemeClr val="bg1"/>
+          </a:solidFill>
+          <a:ln>
+            <a:noFill/>
+          </a:ln>
+        </p:spPr>
+        <p:style>
+          <a:lnRef idx="2">
+            <a:schemeClr val="accent1">
+              <a:shade val="50000"/>
+            </a:schemeClr>
+          </a:lnRef>
+          <a:fillRef idx="1">
+            <a:schemeClr val="accent1"/>
+          </a:fillRef>
+          <a:effectRef idx="0">
+            <a:schemeClr val="accent1"/>
+          </a:effectRef>
+          <a:fontRef idx="minor">
+            <a:schemeClr val="lt1"/>
+          </a:fontRef>
+        </p:style>
+        <p:txBody>
+          <a:bodyPr rtlCol="0" anchor="ctr"/>
+          <a:lstStyle/>
+          <a:p>
+            <a:pPr algn="ctr"/>
+            <a:endParaRPr lang="en-US"/>
+          </a:p>
+        </p:txBody>
+      </p:sp>
+      <p:sp>
+        <p:nvSpPr>
+          <p:cNvPr id="9" name="Rectangle 8"/>
+          <p:cNvSpPr/>
+          <p:nvPr/>
+        </p:nvSpPr>
+        <p:spPr>
+          <a:xfrm>
+            <a:off x="685800" y="3255818"/>
+            <a:ext cx="2590800" cy="2209800"/>
+          </a:xfrm>
+          <a:prstGeom prst="rect">
+            <a:avLst/>
+          </a:prstGeom>
+          <a:solidFill>
+            <a:schemeClr val="bg1"/>
+          </a:solidFill>
+          <a:ln>
+            <a:noFill/>
+          </a:ln>
+        </p:spPr>
+        <p:style>
+          <a:lnRef idx="2">
+            <a:schemeClr val="accent1">
+              <a:shade val="50000"/>
+            </a:schemeClr>
+          </a:lnRef>
+          <a:fillRef idx="1">
+            <a:schemeClr val="accent1"/>
+          </a:fillRef>
+          <a:effectRef idx="0">
+            <a:schemeClr val="accent1"/>
+          </a:effectRef>
+          <a:fontRef idx="minor">
+            <a:schemeClr val="lt1"/>
+          </a:fontRef>
+        </p:style>
+        <p:txBody>
+          <a:bodyPr rtlCol="0" anchor="ctr"/>
+          <a:lstStyle/>
+          <a:p>
+            <a:pPr algn="ctr"/>
+            <a:endParaRPr lang="en-US"/>
+          </a:p>
+        </p:txBody>
+      </p:sp>
+    </p:spTree>
+    <p:extLst>
+      <p:ext uri="{BB962C8B-B14F-4D97-AF65-F5344CB8AC3E}">
+        <p14:creationId xmlns:p14="http://schemas.microsoft.com/office/powerpoint/2010/main" val="2932354022"/>
+      </p:ext>
+    </p:extLst>
+  </p:cSld>
+  <p:clrMapOvr>
+    <a:masterClrMapping/>
+  </p:clrMapOvr>
+  <p:timing>
+    <p:tnLst>
+      <p:par>
+        <p:cTn id="1" dur="indefinite" restart="never" nodeType="tmRoot">
+          <p:childTnLst>
+            <p:seq concurrent="1" nextAc="seek">
+              <p:cTn id="2" dur="indefinite" nodeType="mainSeq">
+                <p:childTnLst>
+                  <p:par>
+                    <p:cTn id="3" fill="hold">
+                      <p:stCondLst>
+                        <p:cond delay="indefinite"/>
+                      </p:stCondLst>
+                      <p:childTnLst>
+                        <p:par>
+                          <p:cTn id="4" fill="hold">
+                            <p:stCondLst>
+                              <p:cond delay="0"/>
+                            </p:stCondLst>
+                            <p:childTnLst>
+                              <p:par>
+                                <p:cTn id="5" presetID="1" presetClass="exit" presetSubtype="0" fill="hold" grpId="0" nodeType="clickEffect">
+                                  <p:stCondLst>
+                                    <p:cond delay="0"/>
+                                  </p:stCondLst>
+                                  <p:childTnLst>
+                                    <p:set>
+                                      <p:cBhvr>
+                                        <p:cTn id="6" dur="1" fill="hold">
+                                          <p:stCondLst>
+                                            <p:cond delay="0"/>
+                                          </p:stCondLst>
+                                        </p:cTn>
+                                        <p:tgtEl>
+                                          <p:spTgt spid="9"/>
+                                        </p:tgtEl>
+                                        <p:attrNameLst>
+                                          <p:attrName>style.visibility</p:attrName>
+                                        </p:attrNameLst>
+                                      </p:cBhvr>
+                                      <p:to>
+                                        <p:strVal val="hidden"/>
+                                      </p:to>
+                                    </p:set>
+                                  </p:childTnLst>
+                                </p:cTn>
+                              </p:par>
+                            </p:childTnLst>
+                          </p:cTn>
+                        </p:par>
+                      </p:childTnLst>
+                    </p:cTn>
+                  </p:par>
+                  <p:par>
+                    <p:cTn id="7" fill="hold">
+                      <p:stCondLst>
+                        <p:cond delay="indefinite"/>
+                      </p:stCondLst>
+                      <p:childTnLst>
+                        <p:par>
+                          <p:cTn id="8" fill="hold">
+                            <p:stCondLst>
+                              <p:cond delay="0"/>
+                            </p:stCondLst>
+                            <p:childTnLst>
+                              <p:par>
+                                <p:cTn id="9" presetID="1" presetClass="exit" presetSubtype="0" fill="hold" grpId="0" nodeType="clickEffect">
+                                  <p:stCondLst>
+                                    <p:cond delay="0"/>
+                                  </p:stCondLst>
+                                  <p:childTnLst>
+                                    <p:set>
+                                      <p:cBhvr>
+                                        <p:cTn id="10" dur="1" fill="hold">
+                                          <p:stCondLst>
+                                            <p:cond delay="0"/>
+                                          </p:stCondLst>
+                                        </p:cTn>
+                                        <p:tgtEl>
+                                          <p:spTgt spid="8"/>
+                                        </p:tgtEl>
+                                        <p:attrNameLst>
+                                          <p:attrName>style.visibility</p:attrName>
+                                        </p:attrNameLst>
+                                      </p:cBhvr>
+                                      <p:to>
+                                        <p:strVal val="hidden"/>
+                                      </p:to>
+                                    </p:set>
+                                  </p:childTnLst>
+                                </p:cTn>
+                              </p:par>
+                            </p:childTnLst>
+                          </p:cTn>
+                        </p:par>
+                      </p:childTnLst>
+                    </p:cTn>
+                  </p:par>
+                </p:childTnLst>
+              </p:cTn>
+              <p:prevCondLst>
+                <p:cond evt="onPrev" delay="0">
+                  <p:tgtEl>
+                    <p:sldTgt/>
+                  </p:tgtEl>
+                </p:cond>
+              </p:prevCondLst>
+              <p:nextCondLst>
+                <p:cond evt="onNext" delay="0">
+                  <p:tgtEl>
+                    <p:sldTgt/>
+                  </p:tgtEl>
+                </p:cond>
+              </p:nextCondLst>
+            </p:seq>
+          </p:childTnLst>
+        </p:cTn>
+      </p:par>
+    </p:tnLst>
+    <p:bldLst>
+      <p:bldP spid="8" grpId="0" animBg="1"/>
+      <p:bldP spid="9" grpId="0" animBg="1"/>
+    </p:bldLst>
+  </p:timing>
+</p:sld>
+</file>
+
+<file path=ppt/slides/slide6.xml><?xml version="1.0" encoding="utf-8"?>
+<p:sld xmlns:a="http://schemas.openxmlformats.org/drawingml/2006/main" xmlns:r="http://schemas.openxmlformats.org/officeDocument/2006/relationships" xmlns:p="http://schemas.openxmlformats.org/presentationml/2006/main">
+  <p:cSld>
+    <p:spTree>
+      <p:nvGrpSpPr>
+        <p:cNvPr id="1" name=""/>
+        <p:cNvGrpSpPr/>
+        <p:nvPr/>
+      </p:nvGrpSpPr>
+      <p:grpSpPr>
+        <a:xfrm>
+          <a:off x="0" y="0"/>
+          <a:ext cx="0" cy="0"/>
+          <a:chOff x="0" y="0"/>
+          <a:chExt cx="0" cy="0"/>
+        </a:xfrm>
+      </p:grpSpPr>
+      <p:sp>
+        <p:nvSpPr>
+          <p:cNvPr id="2" name="Title 1"/>
+          <p:cNvSpPr>
+            <a:spLocks noGrp="1"/>
+          </p:cNvSpPr>
+          <p:nvPr>
+            <p:ph type="title"/>
+          </p:nvPr>
+        </p:nvSpPr>
+        <p:spPr/>
+        <p:txBody>
+          <a:bodyPr/>
+          <a:lstStyle/>
+          <a:p>
+            <a:r>
+              <a:rPr lang="en-US" dirty="0" smtClean="0"/>
+              <a:t>Critique of Stock Concept</a:t>
+            </a:r>
+            <a:endParaRPr lang="en-US" dirty="0"/>
+          </a:p>
+        </p:txBody>
+      </p:sp>
+      <p:sp>
+        <p:nvSpPr>
+          <p:cNvPr id="3" name="Content Placeholder 2"/>
+          <p:cNvSpPr>
+            <a:spLocks noGrp="1"/>
+          </p:cNvSpPr>
+          <p:nvPr>
+            <p:ph idx="1"/>
+          </p:nvPr>
+        </p:nvSpPr>
+        <p:spPr/>
+        <p:txBody>
+          <a:bodyPr/>
+          <a:lstStyle/>
+          <a:p>
+            <a:r>
+              <a:rPr lang="en-US" dirty="0" smtClean="0"/>
+              <a:t>Too narrowly focuses management</a:t>
+            </a:r>
+          </a:p>
+          <a:p>
+            <a:pPr lvl="1"/>
+            <a:r>
+              <a:rPr lang="en-US" dirty="0" smtClean="0"/>
+              <a:t>move towards ecosystem-based approach that considers other species, habitat, etc.</a:t>
+            </a:r>
+          </a:p>
+          <a:p>
+            <a:pPr lvl="2"/>
+            <a:r>
+              <a:rPr lang="en-US" dirty="0" smtClean="0"/>
+              <a:t>but some debate about what this means.</a:t>
+            </a:r>
+          </a:p>
+        </p:txBody>
+      </p:sp>
+      <p:sp>
+        <p:nvSpPr>
+          <p:cNvPr id="4" name="Footer Placeholder 3"/>
+          <p:cNvSpPr>
+            <a:spLocks noGrp="1"/>
+          </p:cNvSpPr>
+          <p:nvPr>
+            <p:ph type="ftr" sz="quarter" idx="10"/>
+          </p:nvPr>
+        </p:nvSpPr>
+        <p:spPr/>
+        <p:txBody>
+          <a:bodyPr/>
+          <a:lstStyle/>
+          <a:p>
+            <a:pPr>
+              <a:defRPr/>
+            </a:pPr>
+            <a:r>
+              <a:rPr lang="en-US" smtClean="0"/>
+              <a:t>Stock Concept</a:t>
+            </a:r>
+            <a:endParaRPr lang="en-US"/>
+          </a:p>
+        </p:txBody>
+      </p:sp>
+      <p:sp>
+        <p:nvSpPr>
+          <p:cNvPr id="5" name="Slide Number Placeholder 4"/>
+          <p:cNvSpPr>
+            <a:spLocks noGrp="1"/>
+          </p:cNvSpPr>
+          <p:nvPr>
+            <p:ph type="sldNum" sz="quarter" idx="11"/>
+          </p:nvPr>
+        </p:nvSpPr>
+        <p:spPr/>
+        <p:txBody>
+          <a:bodyPr/>
+          <a:lstStyle/>
+          <a:p>
+            <a:pPr>
+              <a:defRPr/>
+            </a:pPr>
+            <a:fld id="{A4C5663D-8A97-4D07-AE54-B897400713C4}" type="slidenum">
+              <a:rPr lang="en-US" smtClean="0"/>
+              <a:pPr>
+                <a:defRPr/>
+              </a:pPr>
+              <a:t>6</a:t>
+            </a:fld>
+            <a:endParaRPr lang="en-US"/>
+          </a:p>
+        </p:txBody>
+      </p:sp>
+    </p:spTree>
+    <p:extLst>
+      <p:ext uri="{BB962C8B-B14F-4D97-AF65-F5344CB8AC3E}">
+        <p14:creationId xmlns:p14="http://schemas.microsoft.com/office/powerpoint/2010/main" val="2382811857"/>
+      </p:ext>
+    </p:extLst>
+  </p:cSld>
+  <p:clrMapOvr>
+    <a:masterClrMapping/>
+  </p:clrMapOvr>
+  <p:timing>
+    <p:tnLst>
+      <p:par>
+        <p:cTn id="1" dur="indefinite" restart="never" nodeType="tmRoot"/>
+      </p:par>
+    </p:tnLst>
   </p:timing>
 </p:sld>
 </file>

</xml_diff>